<commit_message>
Various updates for manuscript figures
</commit_message>
<xml_diff>
--- a/Figures/Fig1_Cal_vs_Val/Fig1_composite.pptx
+++ b/Figures/Fig1_Cal_vs_Val/Fig1_composite.pptx
@@ -5,7 +5,8 @@
     <p:sldMasterId id="2147483648" r:id="rId1"/>
   </p:sldMasterIdLst>
   <p:sldIdLst>
-    <p:sldId id="256" r:id="rId2"/>
+    <p:sldId id="257" r:id="rId2"/>
+    <p:sldId id="256" r:id="rId3"/>
   </p:sldIdLst>
   <p:sldSz cx="12192000" cy="6858000"/>
   <p:notesSz cx="6858000" cy="9144000"/>
@@ -104,6 +105,11 @@
       </a:defRPr>
     </a:lvl9pPr>
   </p:defaultTextStyle>
+  <p:extLst>
+    <p:ext uri="{EFAFB233-063F-42B5-8137-9DF3F51BA10A}">
+      <p15:sldGuideLst xmlns:p15="http://schemas.microsoft.com/office/powerpoint/2012/main"/>
+    </p:ext>
+  </p:extLst>
 </p:presentation>
 </file>
 
@@ -254,7 +260,7 @@
           <a:p>
             <a:fld id="{8D92616B-3E38-485E-834C-FEBCC5605172}" type="datetimeFigureOut">
               <a:rPr lang="en-US" smtClean="0"/>
-              <a:t>8/19/2021</a:t>
+              <a:t>9/27/2021</a:t>
             </a:fld>
             <a:endParaRPr lang="en-US"/>
           </a:p>
@@ -452,7 +458,7 @@
           <a:p>
             <a:fld id="{8D92616B-3E38-485E-834C-FEBCC5605172}" type="datetimeFigureOut">
               <a:rPr lang="en-US" smtClean="0"/>
-              <a:t>8/19/2021</a:t>
+              <a:t>9/27/2021</a:t>
             </a:fld>
             <a:endParaRPr lang="en-US"/>
           </a:p>
@@ -660,7 +666,7 @@
           <a:p>
             <a:fld id="{8D92616B-3E38-485E-834C-FEBCC5605172}" type="datetimeFigureOut">
               <a:rPr lang="en-US" smtClean="0"/>
-              <a:t>8/19/2021</a:t>
+              <a:t>9/27/2021</a:t>
             </a:fld>
             <a:endParaRPr lang="en-US"/>
           </a:p>
@@ -858,7 +864,7 @@
           <a:p>
             <a:fld id="{8D92616B-3E38-485E-834C-FEBCC5605172}" type="datetimeFigureOut">
               <a:rPr lang="en-US" smtClean="0"/>
-              <a:t>8/19/2021</a:t>
+              <a:t>9/27/2021</a:t>
             </a:fld>
             <a:endParaRPr lang="en-US"/>
           </a:p>
@@ -1133,7 +1139,7 @@
           <a:p>
             <a:fld id="{8D92616B-3E38-485E-834C-FEBCC5605172}" type="datetimeFigureOut">
               <a:rPr lang="en-US" smtClean="0"/>
-              <a:t>8/19/2021</a:t>
+              <a:t>9/27/2021</a:t>
             </a:fld>
             <a:endParaRPr lang="en-US"/>
           </a:p>
@@ -1398,7 +1404,7 @@
           <a:p>
             <a:fld id="{8D92616B-3E38-485E-834C-FEBCC5605172}" type="datetimeFigureOut">
               <a:rPr lang="en-US" smtClean="0"/>
-              <a:t>8/19/2021</a:t>
+              <a:t>9/27/2021</a:t>
             </a:fld>
             <a:endParaRPr lang="en-US"/>
           </a:p>
@@ -1810,7 +1816,7 @@
           <a:p>
             <a:fld id="{8D92616B-3E38-485E-834C-FEBCC5605172}" type="datetimeFigureOut">
               <a:rPr lang="en-US" smtClean="0"/>
-              <a:t>8/19/2021</a:t>
+              <a:t>9/27/2021</a:t>
             </a:fld>
             <a:endParaRPr lang="en-US"/>
           </a:p>
@@ -1951,7 +1957,7 @@
           <a:p>
             <a:fld id="{8D92616B-3E38-485E-834C-FEBCC5605172}" type="datetimeFigureOut">
               <a:rPr lang="en-US" smtClean="0"/>
-              <a:t>8/19/2021</a:t>
+              <a:t>9/27/2021</a:t>
             </a:fld>
             <a:endParaRPr lang="en-US"/>
           </a:p>
@@ -2064,7 +2070,7 @@
           <a:p>
             <a:fld id="{8D92616B-3E38-485E-834C-FEBCC5605172}" type="datetimeFigureOut">
               <a:rPr lang="en-US" smtClean="0"/>
-              <a:t>8/19/2021</a:t>
+              <a:t>9/27/2021</a:t>
             </a:fld>
             <a:endParaRPr lang="en-US"/>
           </a:p>
@@ -2375,7 +2381,7 @@
           <a:p>
             <a:fld id="{8D92616B-3E38-485E-834C-FEBCC5605172}" type="datetimeFigureOut">
               <a:rPr lang="en-US" smtClean="0"/>
-              <a:t>8/19/2021</a:t>
+              <a:t>9/27/2021</a:t>
             </a:fld>
             <a:endParaRPr lang="en-US"/>
           </a:p>
@@ -2663,7 +2669,7 @@
           <a:p>
             <a:fld id="{8D92616B-3E38-485E-834C-FEBCC5605172}" type="datetimeFigureOut">
               <a:rPr lang="en-US" smtClean="0"/>
-              <a:t>8/19/2021</a:t>
+              <a:t>9/27/2021</a:t>
             </a:fld>
             <a:endParaRPr lang="en-US"/>
           </a:p>
@@ -2904,7 +2910,7 @@
           <a:p>
             <a:fld id="{8D92616B-3E38-485E-834C-FEBCC5605172}" type="datetimeFigureOut">
               <a:rPr lang="en-US" smtClean="0"/>
-              <a:t>8/19/2021</a:t>
+              <a:t>9/27/2021</a:t>
             </a:fld>
             <a:endParaRPr lang="en-US"/>
           </a:p>
@@ -3323,10 +3329,10 @@
       </p:grpSpPr>
       <p:grpSp>
         <p:nvGrpSpPr>
-          <p:cNvPr id="13" name="Group 12">
-            <a:extLst>
-              <a:ext uri="{FF2B5EF4-FFF2-40B4-BE49-F238E27FC236}">
-                <a16:creationId xmlns:a16="http://schemas.microsoft.com/office/drawing/2014/main" id="{8CE86EE6-8054-486A-8392-F1F2A8B1841B}"/>
+          <p:cNvPr id="3" name="Group 2">
+            <a:extLst>
+              <a:ext uri="{FF2B5EF4-FFF2-40B4-BE49-F238E27FC236}">
+                <a16:creationId xmlns:a16="http://schemas.microsoft.com/office/drawing/2014/main" id="{21455CD9-6F47-438B-9232-2BBBB9FA613A}"/>
               </a:ext>
             </a:extLst>
           </p:cNvPr>
@@ -3335,88 +3341,466 @@
         </p:nvGrpSpPr>
         <p:grpSpPr>
           <a:xfrm>
-            <a:off x="170134" y="123389"/>
-            <a:ext cx="8121800" cy="6693577"/>
-            <a:chOff x="170134" y="123389"/>
-            <a:chExt cx="8121800" cy="6693577"/>
+            <a:off x="-31497" y="0"/>
+            <a:ext cx="8323431" cy="6858000"/>
+            <a:chOff x="-31497" y="0"/>
+            <a:chExt cx="8323431" cy="6858000"/>
           </a:xfrm>
         </p:grpSpPr>
-        <p:pic>
-          <p:nvPicPr>
-            <p:cNvPr id="5" name="Picture 4">
+        <p:grpSp>
+          <p:nvGrpSpPr>
+            <p:cNvPr id="2" name="Group 1">
               <a:extLst>
                 <a:ext uri="{FF2B5EF4-FFF2-40B4-BE49-F238E27FC236}">
-                  <a16:creationId xmlns:a16="http://schemas.microsoft.com/office/drawing/2014/main" id="{21856F2D-E47D-4E69-93BD-3C851A30F93A}"/>
+                  <a16:creationId xmlns:a16="http://schemas.microsoft.com/office/drawing/2014/main" id="{55461518-68FB-41D6-B5BF-7DFA00DA0034}"/>
                 </a:ext>
               </a:extLst>
             </p:cNvPr>
-            <p:cNvPicPr>
-              <a:picLocks noChangeAspect="1"/>
-            </p:cNvPicPr>
+            <p:cNvGrpSpPr/>
             <p:nvPr/>
-          </p:nvPicPr>
-          <p:blipFill rotWithShape="1">
-            <a:blip r:embed="rId2">
-              <a:extLst>
-                <a:ext uri="{28A0092B-C50C-407E-A947-70E740481C1C}">
-                  <a14:useLocalDpi xmlns:a14="http://schemas.microsoft.com/office/drawing/2010/main" val="0"/>
-                </a:ext>
-              </a:extLst>
-            </a:blip>
-            <a:srcRect l="15000" t="8376" r="19872" b="10341"/>
-            <a:stretch/>
-          </p:blipFill>
-          <p:spPr>
+          </p:nvGrpSpPr>
+          <p:grpSpPr>
             <a:xfrm>
-              <a:off x="3710354" y="316673"/>
-              <a:ext cx="3274458" cy="6129940"/>
+              <a:off x="-31497" y="0"/>
+              <a:ext cx="8323431" cy="6858000"/>
+              <a:chOff x="-31497" y="0"/>
+              <a:chExt cx="8323431" cy="6858000"/>
             </a:xfrm>
-            <a:prstGeom prst="rect">
-              <a:avLst/>
-            </a:prstGeom>
-          </p:spPr>
-        </p:pic>
-        <p:pic>
-          <p:nvPicPr>
-            <p:cNvPr id="7" name="Picture 6">
+          </p:grpSpPr>
+          <p:grpSp>
+            <p:nvGrpSpPr>
+              <p:cNvPr id="20" name="Group 19">
+                <a:extLst>
+                  <a:ext uri="{FF2B5EF4-FFF2-40B4-BE49-F238E27FC236}">
+                    <a16:creationId xmlns:a16="http://schemas.microsoft.com/office/drawing/2014/main" id="{C8E49217-6A6D-49FD-8EB3-70ED6DCDBBE3}"/>
+                  </a:ext>
+                </a:extLst>
+              </p:cNvPr>
+              <p:cNvGrpSpPr/>
+              <p:nvPr/>
+            </p:nvGrpSpPr>
+            <p:grpSpPr>
+              <a:xfrm>
+                <a:off x="0" y="0"/>
+                <a:ext cx="8291934" cy="6858000"/>
+                <a:chOff x="0" y="0"/>
+                <a:chExt cx="8291934" cy="6858000"/>
+              </a:xfrm>
+            </p:grpSpPr>
+            <p:pic>
+              <p:nvPicPr>
+                <p:cNvPr id="5" name="Picture 4">
+                  <a:extLst>
+                    <a:ext uri="{FF2B5EF4-FFF2-40B4-BE49-F238E27FC236}">
+                      <a16:creationId xmlns:a16="http://schemas.microsoft.com/office/drawing/2014/main" id="{21856F2D-E47D-4E69-93BD-3C851A30F93A}"/>
+                    </a:ext>
+                  </a:extLst>
+                </p:cNvPr>
+                <p:cNvPicPr>
+                  <a:picLocks noChangeAspect="1"/>
+                </p:cNvPicPr>
+                <p:nvPr/>
+              </p:nvPicPr>
+              <p:blipFill rotWithShape="1">
+                <a:blip r:embed="rId2">
+                  <a:extLst>
+                    <a:ext uri="{28A0092B-C50C-407E-A947-70E740481C1C}">
+                      <a14:useLocalDpi xmlns:a14="http://schemas.microsoft.com/office/drawing/2010/main" val="0"/>
+                    </a:ext>
+                  </a:extLst>
+                </a:blip>
+                <a:srcRect l="15000" t="8376" r="19872" b="10341"/>
+                <a:stretch/>
+              </p:blipFill>
+              <p:spPr>
+                <a:xfrm>
+                  <a:off x="3710354" y="316673"/>
+                  <a:ext cx="3274458" cy="6129940"/>
+                </a:xfrm>
+                <a:prstGeom prst="rect">
+                  <a:avLst/>
+                </a:prstGeom>
+              </p:spPr>
+            </p:pic>
+            <p:pic>
+              <p:nvPicPr>
+                <p:cNvPr id="7" name="Picture 6">
+                  <a:extLst>
+                    <a:ext uri="{FF2B5EF4-FFF2-40B4-BE49-F238E27FC236}">
+                      <a16:creationId xmlns:a16="http://schemas.microsoft.com/office/drawing/2014/main" id="{74E4115C-C9B6-416F-B7F7-DA7768317C41}"/>
+                    </a:ext>
+                  </a:extLst>
+                </p:cNvPr>
+                <p:cNvPicPr>
+                  <a:picLocks noChangeAspect="1"/>
+                </p:cNvPicPr>
+                <p:nvPr/>
+              </p:nvPicPr>
+              <p:blipFill rotWithShape="1">
+                <a:blip r:embed="rId2">
+                  <a:extLst>
+                    <a:ext uri="{28A0092B-C50C-407E-A947-70E740481C1C}">
+                      <a14:useLocalDpi xmlns:a14="http://schemas.microsoft.com/office/drawing/2010/main" val="0"/>
+                    </a:ext>
+                  </a:extLst>
+                </a:blip>
+                <a:srcRect l="85128" t="27265" r="1154" b="29231"/>
+                <a:stretch/>
+              </p:blipFill>
+              <p:spPr>
+                <a:xfrm>
+                  <a:off x="7178243" y="1522922"/>
+                  <a:ext cx="627184" cy="2983523"/>
+                </a:xfrm>
+                <a:prstGeom prst="rect">
+                  <a:avLst/>
+                </a:prstGeom>
+              </p:spPr>
+            </p:pic>
+            <p:sp>
+              <p:nvSpPr>
+                <p:cNvPr id="8" name="TextBox 7">
+                  <a:extLst>
+                    <a:ext uri="{FF2B5EF4-FFF2-40B4-BE49-F238E27FC236}">
+                      <a16:creationId xmlns:a16="http://schemas.microsoft.com/office/drawing/2014/main" id="{1BDC1D63-20C8-4C2C-BCC2-24EDFCE52FF4}"/>
+                    </a:ext>
+                  </a:extLst>
+                </p:cNvPr>
+                <p:cNvSpPr txBox="1"/>
+                <p:nvPr/>
+              </p:nvSpPr>
+              <p:spPr>
+                <a:xfrm>
+                  <a:off x="7049289" y="1339980"/>
+                  <a:ext cx="1242645" cy="261610"/>
+                </a:xfrm>
+                <a:prstGeom prst="rect">
+                  <a:avLst/>
+                </a:prstGeom>
+                <a:noFill/>
+              </p:spPr>
+              <p:txBody>
+                <a:bodyPr wrap="square" rtlCol="0">
+                  <a:spAutoFit/>
+                </a:bodyPr>
+                <a:lstStyle/>
+                <a:p>
+                  <a:r>
+                    <a:rPr lang="en-US" sz="1100" dirty="0"/>
+                    <a:t>Elevation (m)</a:t>
+                  </a:r>
+                </a:p>
+              </p:txBody>
+            </p:sp>
+            <p:pic>
+              <p:nvPicPr>
+                <p:cNvPr id="1026" name="Picture 2" descr="What Is a North Arrow On a Map? – The Land Development Site">
+                  <a:extLst>
+                    <a:ext uri="{FF2B5EF4-FFF2-40B4-BE49-F238E27FC236}">
+                      <a16:creationId xmlns:a16="http://schemas.microsoft.com/office/drawing/2014/main" id="{9B685C99-2C79-4E9F-AFFF-08C9E6009FAC}"/>
+                    </a:ext>
+                  </a:extLst>
+                </p:cNvPr>
+                <p:cNvPicPr>
+                  <a:picLocks noChangeAspect="1" noChangeArrowheads="1"/>
+                </p:cNvPicPr>
+                <p:nvPr/>
+              </p:nvPicPr>
+              <p:blipFill rotWithShape="1">
+                <a:blip r:embed="rId3">
+                  <a:extLst>
+                    <a:ext uri="{28A0092B-C50C-407E-A947-70E740481C1C}">
+                      <a14:useLocalDpi xmlns:a14="http://schemas.microsoft.com/office/drawing/2010/main" val="0"/>
+                    </a:ext>
+                  </a:extLst>
+                </a:blip>
+                <a:srcRect l="27350" t="22137" r="28205" b="21111"/>
+                <a:stretch/>
+              </p:blipFill>
+              <p:spPr bwMode="auto">
+                <a:xfrm>
+                  <a:off x="7326642" y="852317"/>
+                  <a:ext cx="334252" cy="426814"/>
+                </a:xfrm>
+                <a:prstGeom prst="rect">
+                  <a:avLst/>
+                </a:prstGeom>
+                <a:noFill/>
+                <a:extLst>
+                  <a:ext uri="{909E8E84-426E-40DD-AFC4-6F175D3DCCD1}">
+                    <a14:hiddenFill xmlns:a14="http://schemas.microsoft.com/office/drawing/2010/main">
+                      <a:solidFill>
+                        <a:srgbClr val="FFFFFF"/>
+                      </a:solidFill>
+                    </a14:hiddenFill>
+                  </a:ext>
+                </a:extLst>
+              </p:spPr>
+            </p:pic>
+            <p:pic>
+              <p:nvPicPr>
+                <p:cNvPr id="19" name="Picture 18">
+                  <a:extLst>
+                    <a:ext uri="{FF2B5EF4-FFF2-40B4-BE49-F238E27FC236}">
+                      <a16:creationId xmlns:a16="http://schemas.microsoft.com/office/drawing/2014/main" id="{BD28D44D-7C83-4543-9312-EA8F742204D0}"/>
+                    </a:ext>
+                  </a:extLst>
+                </p:cNvPr>
+                <p:cNvPicPr>
+                  <a:picLocks noChangeAspect="1"/>
+                </p:cNvPicPr>
+                <p:nvPr/>
+              </p:nvPicPr>
+              <p:blipFill>
+                <a:blip r:embed="rId4">
+                  <a:extLst>
+                    <a:ext uri="{28A0092B-C50C-407E-A947-70E740481C1C}">
+                      <a14:useLocalDpi xmlns:a14="http://schemas.microsoft.com/office/drawing/2010/main" val="0"/>
+                    </a:ext>
+                  </a:extLst>
+                </a:blip>
+                <a:stretch>
+                  <a:fillRect/>
+                </a:stretch>
+              </p:blipFill>
+              <p:spPr>
+                <a:xfrm>
+                  <a:off x="0" y="0"/>
+                  <a:ext cx="3429000" cy="6858000"/>
+                </a:xfrm>
+                <a:prstGeom prst="rect">
+                  <a:avLst/>
+                </a:prstGeom>
+              </p:spPr>
+            </p:pic>
+          </p:grpSp>
+          <p:sp>
+            <p:nvSpPr>
+              <p:cNvPr id="9" name="TextBox 8">
+                <a:extLst>
+                  <a:ext uri="{FF2B5EF4-FFF2-40B4-BE49-F238E27FC236}">
+                    <a16:creationId xmlns:a16="http://schemas.microsoft.com/office/drawing/2014/main" id="{0425B153-CBCE-4C07-BB12-E7808E2B1BCD}"/>
+                  </a:ext>
+                </a:extLst>
+              </p:cNvPr>
+              <p:cNvSpPr txBox="1"/>
+              <p:nvPr/>
+            </p:nvSpPr>
+            <p:spPr>
+              <a:xfrm rot="16200000">
+                <a:off x="-1304116" y="1513251"/>
+                <a:ext cx="2791461" cy="246221"/>
+              </a:xfrm>
+              <a:prstGeom prst="rect">
+                <a:avLst/>
+              </a:prstGeom>
+              <a:solidFill>
+                <a:schemeClr val="bg1"/>
+              </a:solidFill>
+            </p:spPr>
+            <p:txBody>
+              <a:bodyPr wrap="square" rtlCol="0">
+                <a:spAutoFit/>
+              </a:bodyPr>
+              <a:lstStyle/>
+              <a:p>
+                <a:pPr algn="ctr"/>
+                <a:r>
+                  <a:rPr lang="en-US" sz="1000" dirty="0">
+                    <a:latin typeface="Arial" panose="020B0604020202020204" pitchFamily="34" charset="0"/>
+                    <a:cs typeface="Arial" panose="020B0604020202020204" pitchFamily="34" charset="0"/>
+                  </a:rPr>
+                  <a:t>Field SOC Stock (kg m</a:t>
+                </a:r>
+                <a:r>
+                  <a:rPr lang="en-US" sz="1000" baseline="30000" dirty="0">
+                    <a:latin typeface="Arial" panose="020B0604020202020204" pitchFamily="34" charset="0"/>
+                    <a:cs typeface="Arial" panose="020B0604020202020204" pitchFamily="34" charset="0"/>
+                  </a:rPr>
+                  <a:t>-2</a:t>
+                </a:r>
+                <a:r>
+                  <a:rPr lang="en-US" sz="1000" dirty="0">
+                    <a:latin typeface="Arial" panose="020B0604020202020204" pitchFamily="34" charset="0"/>
+                    <a:cs typeface="Arial" panose="020B0604020202020204" pitchFamily="34" charset="0"/>
+                  </a:rPr>
+                  <a:t>)</a:t>
+                </a:r>
+              </a:p>
+            </p:txBody>
+          </p:sp>
+          <p:sp>
+            <p:nvSpPr>
+              <p:cNvPr id="10" name="TextBox 9">
+                <a:extLst>
+                  <a:ext uri="{FF2B5EF4-FFF2-40B4-BE49-F238E27FC236}">
+                    <a16:creationId xmlns:a16="http://schemas.microsoft.com/office/drawing/2014/main" id="{B69ABA5E-981B-4F53-9030-199241EE37ED}"/>
+                  </a:ext>
+                </a:extLst>
+              </p:cNvPr>
+              <p:cNvSpPr txBox="1"/>
+              <p:nvPr/>
+            </p:nvSpPr>
+            <p:spPr>
+              <a:xfrm rot="16200000">
+                <a:off x="-1304117" y="4927772"/>
+                <a:ext cx="2791461" cy="246221"/>
+              </a:xfrm>
+              <a:prstGeom prst="rect">
+                <a:avLst/>
+              </a:prstGeom>
+              <a:solidFill>
+                <a:schemeClr val="bg1"/>
+              </a:solidFill>
+            </p:spPr>
+            <p:txBody>
+              <a:bodyPr wrap="square" rtlCol="0">
+                <a:spAutoFit/>
+              </a:bodyPr>
+              <a:lstStyle/>
+              <a:p>
+                <a:pPr algn="ctr"/>
+                <a:r>
+                  <a:rPr lang="en-US" sz="1000" dirty="0">
+                    <a:latin typeface="Arial" panose="020B0604020202020204" pitchFamily="34" charset="0"/>
+                    <a:cs typeface="Arial" panose="020B0604020202020204" pitchFamily="34" charset="0"/>
+                  </a:rPr>
+                  <a:t>Field SOC Stock (kg m</a:t>
+                </a:r>
+                <a:r>
+                  <a:rPr lang="en-US" sz="1000" baseline="30000" dirty="0">
+                    <a:latin typeface="Arial" panose="020B0604020202020204" pitchFamily="34" charset="0"/>
+                    <a:cs typeface="Arial" panose="020B0604020202020204" pitchFamily="34" charset="0"/>
+                  </a:rPr>
+                  <a:t>-2</a:t>
+                </a:r>
+                <a:r>
+                  <a:rPr lang="en-US" sz="1000" dirty="0">
+                    <a:latin typeface="Arial" panose="020B0604020202020204" pitchFamily="34" charset="0"/>
+                    <a:cs typeface="Arial" panose="020B0604020202020204" pitchFamily="34" charset="0"/>
+                  </a:rPr>
+                  <a:t>)</a:t>
+                </a:r>
+              </a:p>
+            </p:txBody>
+          </p:sp>
+          <p:sp>
+            <p:nvSpPr>
+              <p:cNvPr id="11" name="TextBox 10">
+                <a:extLst>
+                  <a:ext uri="{FF2B5EF4-FFF2-40B4-BE49-F238E27FC236}">
+                    <a16:creationId xmlns:a16="http://schemas.microsoft.com/office/drawing/2014/main" id="{E45B88F3-AFE6-45C9-A9FE-0370B813A3F8}"/>
+                  </a:ext>
+                </a:extLst>
+              </p:cNvPr>
+              <p:cNvSpPr txBox="1"/>
+              <p:nvPr/>
+            </p:nvSpPr>
+            <p:spPr>
+              <a:xfrm>
+                <a:off x="391180" y="3177113"/>
+                <a:ext cx="2987375" cy="246221"/>
+              </a:xfrm>
+              <a:prstGeom prst="rect">
+                <a:avLst/>
+              </a:prstGeom>
+              <a:solidFill>
+                <a:schemeClr val="bg1"/>
+              </a:solidFill>
+            </p:spPr>
+            <p:txBody>
+              <a:bodyPr wrap="square" rtlCol="0">
+                <a:spAutoFit/>
+              </a:bodyPr>
+              <a:lstStyle/>
+              <a:p>
+                <a:pPr algn="ctr"/>
+                <a:r>
+                  <a:rPr lang="en-US" sz="1000" dirty="0">
+                    <a:latin typeface="Arial" panose="020B0604020202020204" pitchFamily="34" charset="0"/>
+                    <a:cs typeface="Arial" panose="020B0604020202020204" pitchFamily="34" charset="0"/>
+                  </a:rPr>
+                  <a:t>MIMICS SOC Stock (kg m</a:t>
+                </a:r>
+                <a:r>
+                  <a:rPr lang="en-US" sz="1000" baseline="30000" dirty="0">
+                    <a:latin typeface="Arial" panose="020B0604020202020204" pitchFamily="34" charset="0"/>
+                    <a:cs typeface="Arial" panose="020B0604020202020204" pitchFamily="34" charset="0"/>
+                  </a:rPr>
+                  <a:t>-2</a:t>
+                </a:r>
+                <a:r>
+                  <a:rPr lang="en-US" sz="1000" dirty="0">
+                    <a:latin typeface="Arial" panose="020B0604020202020204" pitchFamily="34" charset="0"/>
+                    <a:cs typeface="Arial" panose="020B0604020202020204" pitchFamily="34" charset="0"/>
+                  </a:rPr>
+                  <a:t>)</a:t>
+                </a:r>
+              </a:p>
+            </p:txBody>
+          </p:sp>
+          <p:sp>
+            <p:nvSpPr>
+              <p:cNvPr id="12" name="TextBox 11">
+                <a:extLst>
+                  <a:ext uri="{FF2B5EF4-FFF2-40B4-BE49-F238E27FC236}">
+                    <a16:creationId xmlns:a16="http://schemas.microsoft.com/office/drawing/2014/main" id="{DD7E9D75-B6B7-4ABA-A022-8BC6FB279FCF}"/>
+                  </a:ext>
+                </a:extLst>
+              </p:cNvPr>
+              <p:cNvSpPr txBox="1"/>
+              <p:nvPr/>
+            </p:nvSpPr>
+            <p:spPr>
+              <a:xfrm>
+                <a:off x="387167" y="6608123"/>
+                <a:ext cx="2987375" cy="246221"/>
+              </a:xfrm>
+              <a:prstGeom prst="rect">
+                <a:avLst/>
+              </a:prstGeom>
+              <a:solidFill>
+                <a:schemeClr val="bg1"/>
+              </a:solidFill>
+            </p:spPr>
+            <p:txBody>
+              <a:bodyPr wrap="square" rtlCol="0">
+                <a:spAutoFit/>
+              </a:bodyPr>
+              <a:lstStyle/>
+              <a:p>
+                <a:pPr algn="ctr"/>
+                <a:r>
+                  <a:rPr lang="en-US" sz="1000" dirty="0">
+                    <a:latin typeface="Arial" panose="020B0604020202020204" pitchFamily="34" charset="0"/>
+                    <a:cs typeface="Arial" panose="020B0604020202020204" pitchFamily="34" charset="0"/>
+                  </a:rPr>
+                  <a:t>MIMICS SOC Stock (kg m</a:t>
+                </a:r>
+                <a:r>
+                  <a:rPr lang="en-US" sz="1000" baseline="30000" dirty="0">
+                    <a:latin typeface="Arial" panose="020B0604020202020204" pitchFamily="34" charset="0"/>
+                    <a:cs typeface="Arial" panose="020B0604020202020204" pitchFamily="34" charset="0"/>
+                  </a:rPr>
+                  <a:t>-2</a:t>
+                </a:r>
+                <a:r>
+                  <a:rPr lang="en-US" sz="1000" dirty="0">
+                    <a:latin typeface="Arial" panose="020B0604020202020204" pitchFamily="34" charset="0"/>
+                    <a:cs typeface="Arial" panose="020B0604020202020204" pitchFamily="34" charset="0"/>
+                  </a:rPr>
+                  <a:t>)</a:t>
+                </a:r>
+              </a:p>
+            </p:txBody>
+          </p:sp>
+        </p:grpSp>
+        <p:sp>
+          <p:nvSpPr>
+            <p:cNvPr id="13" name="TextBox 12">
               <a:extLst>
                 <a:ext uri="{FF2B5EF4-FFF2-40B4-BE49-F238E27FC236}">
-                  <a16:creationId xmlns:a16="http://schemas.microsoft.com/office/drawing/2014/main" id="{74E4115C-C9B6-416F-B7F7-DA7768317C41}"/>
-                </a:ext>
-              </a:extLst>
-            </p:cNvPr>
-            <p:cNvPicPr>
-              <a:picLocks noChangeAspect="1"/>
-            </p:cNvPicPr>
-            <p:nvPr/>
-          </p:nvPicPr>
-          <p:blipFill rotWithShape="1">
-            <a:blip r:embed="rId2">
-              <a:extLst>
-                <a:ext uri="{28A0092B-C50C-407E-A947-70E740481C1C}">
-                  <a14:useLocalDpi xmlns:a14="http://schemas.microsoft.com/office/drawing/2010/main" val="0"/>
-                </a:ext>
-              </a:extLst>
-            </a:blip>
-            <a:srcRect l="85128" t="27265" r="1154" b="29231"/>
-            <a:stretch/>
-          </p:blipFill>
-          <p:spPr>
-            <a:xfrm>
-              <a:off x="7178243" y="1522922"/>
-              <a:ext cx="627184" cy="2983523"/>
-            </a:xfrm>
-            <a:prstGeom prst="rect">
-              <a:avLst/>
-            </a:prstGeom>
-          </p:spPr>
-        </p:pic>
-        <p:sp>
-          <p:nvSpPr>
-            <p:cNvPr id="8" name="TextBox 7">
-              <a:extLst>
-                <a:ext uri="{FF2B5EF4-FFF2-40B4-BE49-F238E27FC236}">
-                  <a16:creationId xmlns:a16="http://schemas.microsoft.com/office/drawing/2014/main" id="{1BDC1D63-20C8-4C2C-BCC2-24EDFCE52FF4}"/>
+                  <a16:creationId xmlns:a16="http://schemas.microsoft.com/office/drawing/2014/main" id="{0AC62E78-979B-4F91-ACFF-84508CAA8A37}"/>
                 </a:ext>
               </a:extLst>
             </p:cNvPr>
@@ -3425,8 +3809,8 @@
           </p:nvSpPr>
           <p:spPr>
             <a:xfrm>
-              <a:off x="7049289" y="1339980"/>
-              <a:ext cx="1242645" cy="261610"/>
+              <a:off x="369122" y="196356"/>
+              <a:ext cx="436992" cy="369332"/>
             </a:xfrm>
             <a:prstGeom prst="rect">
               <a:avLst/>
@@ -3440,93 +3824,594 @@
             <a:lstStyle/>
             <a:p>
               <a:r>
-                <a:rPr lang="en-US" sz="1100" dirty="0"/>
-                <a:t>Elevation (m)</a:t>
+                <a:rPr lang="en-US" dirty="0"/>
+                <a:t>A</a:t>
               </a:r>
             </a:p>
           </p:txBody>
         </p:sp>
-        <p:pic>
-          <p:nvPicPr>
-            <p:cNvPr id="12" name="Picture 11">
+        <p:sp>
+          <p:nvSpPr>
+            <p:cNvPr id="14" name="TextBox 13">
               <a:extLst>
                 <a:ext uri="{FF2B5EF4-FFF2-40B4-BE49-F238E27FC236}">
-                  <a16:creationId xmlns:a16="http://schemas.microsoft.com/office/drawing/2014/main" id="{54752EE1-E66B-4925-A730-80EC09D677FE}"/>
+                  <a16:creationId xmlns:a16="http://schemas.microsoft.com/office/drawing/2014/main" id="{DBC730E8-9D7C-45E4-91E6-301884A1A77F}"/>
                 </a:ext>
               </a:extLst>
             </p:cNvPr>
-            <p:cNvPicPr>
-              <a:picLocks noChangeAspect="1"/>
-            </p:cNvPicPr>
+            <p:cNvSpPr txBox="1"/>
             <p:nvPr/>
-          </p:nvPicPr>
-          <p:blipFill>
-            <a:blip r:embed="rId3">
-              <a:extLst>
-                <a:ext uri="{28A0092B-C50C-407E-A947-70E740481C1C}">
-                  <a14:useLocalDpi xmlns:a14="http://schemas.microsoft.com/office/drawing/2010/main" val="0"/>
-                </a:ext>
-              </a:extLst>
-            </a:blip>
-            <a:stretch>
-              <a:fillRect/>
-            </a:stretch>
-          </p:blipFill>
+          </p:nvSpPr>
           <p:spPr>
             <a:xfrm>
-              <a:off x="170134" y="123389"/>
-              <a:ext cx="3346789" cy="6693577"/>
-            </a:xfrm>
-            <a:prstGeom prst="rect">
-              <a:avLst/>
-            </a:prstGeom>
-          </p:spPr>
-        </p:pic>
-        <p:pic>
-          <p:nvPicPr>
-            <p:cNvPr id="1026" name="Picture 2" descr="What Is a North Arrow On a Map? – The Land Development Site">
-              <a:extLst>
-                <a:ext uri="{FF2B5EF4-FFF2-40B4-BE49-F238E27FC236}">
-                  <a16:creationId xmlns:a16="http://schemas.microsoft.com/office/drawing/2014/main" id="{9B685C99-2C79-4E9F-AFFF-08C9E6009FAC}"/>
-                </a:ext>
-              </a:extLst>
-            </p:cNvPr>
-            <p:cNvPicPr>
-              <a:picLocks noChangeAspect="1" noChangeArrowheads="1"/>
-            </p:cNvPicPr>
-            <p:nvPr/>
-          </p:nvPicPr>
-          <p:blipFill rotWithShape="1">
-            <a:blip r:embed="rId4">
-              <a:extLst>
-                <a:ext uri="{28A0092B-C50C-407E-A947-70E740481C1C}">
-                  <a14:useLocalDpi xmlns:a14="http://schemas.microsoft.com/office/drawing/2010/main" val="0"/>
-                </a:ext>
-              </a:extLst>
-            </a:blip>
-            <a:srcRect l="27350" t="22137" r="28205" b="21111"/>
-            <a:stretch/>
-          </p:blipFill>
-          <p:spPr bwMode="auto">
-            <a:xfrm>
-              <a:off x="7326642" y="852317"/>
-              <a:ext cx="334252" cy="426814"/>
+              <a:off x="369122" y="3619955"/>
+              <a:ext cx="436992" cy="369332"/>
             </a:xfrm>
             <a:prstGeom prst="rect">
               <a:avLst/>
             </a:prstGeom>
             <a:noFill/>
-            <a:extLst>
-              <a:ext uri="{909E8E84-426E-40DD-AFC4-6F175D3DCCD1}">
-                <a14:hiddenFill xmlns:a14="http://schemas.microsoft.com/office/drawing/2010/main">
-                  <a:solidFill>
-                    <a:srgbClr val="FFFFFF"/>
-                  </a:solidFill>
-                </a14:hiddenFill>
-              </a:ext>
-            </a:extLst>
           </p:spPr>
-        </p:pic>
+          <p:txBody>
+            <a:bodyPr wrap="square" rtlCol="0">
+              <a:spAutoFit/>
+            </a:bodyPr>
+            <a:lstStyle/>
+            <a:p>
+              <a:r>
+                <a:rPr lang="en-US" dirty="0"/>
+                <a:t>B</a:t>
+              </a:r>
+            </a:p>
+          </p:txBody>
+        </p:sp>
+      </p:grpSp>
+    </p:spTree>
+    <p:extLst>
+      <p:ext uri="{BB962C8B-B14F-4D97-AF65-F5344CB8AC3E}">
+        <p14:creationId xmlns:p14="http://schemas.microsoft.com/office/powerpoint/2010/main" val="127183222"/>
+      </p:ext>
+    </p:extLst>
+  </p:cSld>
+  <p:clrMapOvr>
+    <a:masterClrMapping/>
+  </p:clrMapOvr>
+</p:sld>
+</file>
+
+<file path=ppt/slides/slide2.xml><?xml version="1.0" encoding="utf-8"?>
+<p:sld xmlns:a="http://schemas.openxmlformats.org/drawingml/2006/main" xmlns:r="http://schemas.openxmlformats.org/officeDocument/2006/relationships" xmlns:p="http://schemas.openxmlformats.org/presentationml/2006/main">
+  <p:cSld>
+    <p:spTree>
+      <p:nvGrpSpPr>
+        <p:cNvPr id="1" name=""/>
+        <p:cNvGrpSpPr/>
+        <p:nvPr/>
+      </p:nvGrpSpPr>
+      <p:grpSpPr>
+        <a:xfrm>
+          <a:off x="0" y="0"/>
+          <a:ext cx="0" cy="0"/>
+          <a:chOff x="0" y="0"/>
+          <a:chExt cx="0" cy="0"/>
+        </a:xfrm>
+      </p:grpSpPr>
+      <p:grpSp>
+        <p:nvGrpSpPr>
+          <p:cNvPr id="12" name="Group 11">
+            <a:extLst>
+              <a:ext uri="{FF2B5EF4-FFF2-40B4-BE49-F238E27FC236}">
+                <a16:creationId xmlns:a16="http://schemas.microsoft.com/office/drawing/2014/main" id="{77352697-5337-4EC2-98E6-29F9DD775B2C}"/>
+              </a:ext>
+            </a:extLst>
+          </p:cNvPr>
+          <p:cNvGrpSpPr/>
+          <p:nvPr/>
+        </p:nvGrpSpPr>
+        <p:grpSpPr>
+          <a:xfrm>
+            <a:off x="94839" y="0"/>
+            <a:ext cx="8197095" cy="6858000"/>
+            <a:chOff x="94839" y="0"/>
+            <a:chExt cx="8197095" cy="6858000"/>
+          </a:xfrm>
+        </p:grpSpPr>
+        <p:grpSp>
+          <p:nvGrpSpPr>
+            <p:cNvPr id="6" name="Group 5">
+              <a:extLst>
+                <a:ext uri="{FF2B5EF4-FFF2-40B4-BE49-F238E27FC236}">
+                  <a16:creationId xmlns:a16="http://schemas.microsoft.com/office/drawing/2014/main" id="{D5245B54-6699-47D8-AEB6-D2CF47363F14}"/>
+                </a:ext>
+              </a:extLst>
+            </p:cNvPr>
+            <p:cNvGrpSpPr/>
+            <p:nvPr/>
+          </p:nvGrpSpPr>
+          <p:grpSpPr>
+            <a:xfrm>
+              <a:off x="94839" y="0"/>
+              <a:ext cx="8197095" cy="6858000"/>
+              <a:chOff x="94839" y="0"/>
+              <a:chExt cx="8197095" cy="6858000"/>
+            </a:xfrm>
+          </p:grpSpPr>
+          <p:pic>
+            <p:nvPicPr>
+              <p:cNvPr id="5" name="Picture 4">
+                <a:extLst>
+                  <a:ext uri="{FF2B5EF4-FFF2-40B4-BE49-F238E27FC236}">
+                    <a16:creationId xmlns:a16="http://schemas.microsoft.com/office/drawing/2014/main" id="{21856F2D-E47D-4E69-93BD-3C851A30F93A}"/>
+                  </a:ext>
+                </a:extLst>
+              </p:cNvPr>
+              <p:cNvPicPr>
+                <a:picLocks noChangeAspect="1"/>
+              </p:cNvPicPr>
+              <p:nvPr/>
+            </p:nvPicPr>
+            <p:blipFill rotWithShape="1">
+              <a:blip r:embed="rId2">
+                <a:extLst>
+                  <a:ext uri="{28A0092B-C50C-407E-A947-70E740481C1C}">
+                    <a14:useLocalDpi xmlns:a14="http://schemas.microsoft.com/office/drawing/2010/main" val="0"/>
+                  </a:ext>
+                </a:extLst>
+              </a:blip>
+              <a:srcRect l="15000" t="8376" r="19872" b="10341"/>
+              <a:stretch/>
+            </p:blipFill>
+            <p:spPr>
+              <a:xfrm>
+                <a:off x="3710354" y="316673"/>
+                <a:ext cx="3274458" cy="6129940"/>
+              </a:xfrm>
+              <a:prstGeom prst="rect">
+                <a:avLst/>
+              </a:prstGeom>
+            </p:spPr>
+          </p:pic>
+          <p:pic>
+            <p:nvPicPr>
+              <p:cNvPr id="7" name="Picture 6">
+                <a:extLst>
+                  <a:ext uri="{FF2B5EF4-FFF2-40B4-BE49-F238E27FC236}">
+                    <a16:creationId xmlns:a16="http://schemas.microsoft.com/office/drawing/2014/main" id="{74E4115C-C9B6-416F-B7F7-DA7768317C41}"/>
+                  </a:ext>
+                </a:extLst>
+              </p:cNvPr>
+              <p:cNvPicPr>
+                <a:picLocks noChangeAspect="1"/>
+              </p:cNvPicPr>
+              <p:nvPr/>
+            </p:nvPicPr>
+            <p:blipFill rotWithShape="1">
+              <a:blip r:embed="rId2">
+                <a:extLst>
+                  <a:ext uri="{28A0092B-C50C-407E-A947-70E740481C1C}">
+                    <a14:useLocalDpi xmlns:a14="http://schemas.microsoft.com/office/drawing/2010/main" val="0"/>
+                  </a:ext>
+                </a:extLst>
+              </a:blip>
+              <a:srcRect l="85128" t="27265" r="1154" b="29231"/>
+              <a:stretch/>
+            </p:blipFill>
+            <p:spPr>
+              <a:xfrm>
+                <a:off x="7178243" y="1522922"/>
+                <a:ext cx="627184" cy="2983523"/>
+              </a:xfrm>
+              <a:prstGeom prst="rect">
+                <a:avLst/>
+              </a:prstGeom>
+            </p:spPr>
+          </p:pic>
+          <p:sp>
+            <p:nvSpPr>
+              <p:cNvPr id="8" name="TextBox 7">
+                <a:extLst>
+                  <a:ext uri="{FF2B5EF4-FFF2-40B4-BE49-F238E27FC236}">
+                    <a16:creationId xmlns:a16="http://schemas.microsoft.com/office/drawing/2014/main" id="{1BDC1D63-20C8-4C2C-BCC2-24EDFCE52FF4}"/>
+                  </a:ext>
+                </a:extLst>
+              </p:cNvPr>
+              <p:cNvSpPr txBox="1"/>
+              <p:nvPr/>
+            </p:nvSpPr>
+            <p:spPr>
+              <a:xfrm>
+                <a:off x="7049289" y="1339980"/>
+                <a:ext cx="1242645" cy="261610"/>
+              </a:xfrm>
+              <a:prstGeom prst="rect">
+                <a:avLst/>
+              </a:prstGeom>
+              <a:noFill/>
+            </p:spPr>
+            <p:txBody>
+              <a:bodyPr wrap="square" rtlCol="0">
+                <a:spAutoFit/>
+              </a:bodyPr>
+              <a:lstStyle/>
+              <a:p>
+                <a:r>
+                  <a:rPr lang="en-US" sz="1100" dirty="0"/>
+                  <a:t>Elevation (m)</a:t>
+                </a:r>
+              </a:p>
+            </p:txBody>
+          </p:sp>
+          <p:pic>
+            <p:nvPicPr>
+              <p:cNvPr id="1026" name="Picture 2" descr="What Is a North Arrow On a Map? – The Land Development Site">
+                <a:extLst>
+                  <a:ext uri="{FF2B5EF4-FFF2-40B4-BE49-F238E27FC236}">
+                    <a16:creationId xmlns:a16="http://schemas.microsoft.com/office/drawing/2014/main" id="{9B685C99-2C79-4E9F-AFFF-08C9E6009FAC}"/>
+                  </a:ext>
+                </a:extLst>
+              </p:cNvPr>
+              <p:cNvPicPr>
+                <a:picLocks noChangeAspect="1" noChangeArrowheads="1"/>
+              </p:cNvPicPr>
+              <p:nvPr/>
+            </p:nvPicPr>
+            <p:blipFill rotWithShape="1">
+              <a:blip r:embed="rId3">
+                <a:extLst>
+                  <a:ext uri="{28A0092B-C50C-407E-A947-70E740481C1C}">
+                    <a14:useLocalDpi xmlns:a14="http://schemas.microsoft.com/office/drawing/2010/main" val="0"/>
+                  </a:ext>
+                </a:extLst>
+              </a:blip>
+              <a:srcRect l="27350" t="22137" r="28205" b="21111"/>
+              <a:stretch/>
+            </p:blipFill>
+            <p:spPr bwMode="auto">
+              <a:xfrm>
+                <a:off x="7326642" y="852317"/>
+                <a:ext cx="334252" cy="426814"/>
+              </a:xfrm>
+              <a:prstGeom prst="rect">
+                <a:avLst/>
+              </a:prstGeom>
+              <a:noFill/>
+              <a:extLst>
+                <a:ext uri="{909E8E84-426E-40DD-AFC4-6F175D3DCCD1}">
+                  <a14:hiddenFill xmlns:a14="http://schemas.microsoft.com/office/drawing/2010/main">
+                    <a:solidFill>
+                      <a:srgbClr val="FFFFFF"/>
+                    </a:solidFill>
+                  </a14:hiddenFill>
+                </a:ext>
+              </a:extLst>
+            </p:spPr>
+          </p:pic>
+          <p:pic>
+            <p:nvPicPr>
+              <p:cNvPr id="3" name="Picture 2">
+                <a:extLst>
+                  <a:ext uri="{FF2B5EF4-FFF2-40B4-BE49-F238E27FC236}">
+                    <a16:creationId xmlns:a16="http://schemas.microsoft.com/office/drawing/2014/main" id="{0A162054-0688-4B6F-97B8-52227E272991}"/>
+                  </a:ext>
+                </a:extLst>
+              </p:cNvPr>
+              <p:cNvPicPr>
+                <a:picLocks noChangeAspect="1"/>
+              </p:cNvPicPr>
+              <p:nvPr/>
+            </p:nvPicPr>
+            <p:blipFill rotWithShape="1">
+              <a:blip r:embed="rId4">
+                <a:extLst>
+                  <a:ext uri="{28A0092B-C50C-407E-A947-70E740481C1C}">
+                    <a14:useLocalDpi xmlns:a14="http://schemas.microsoft.com/office/drawing/2010/main" val="0"/>
+                  </a:ext>
+                </a:extLst>
+              </a:blip>
+              <a:srcRect l="185" r="-1"/>
+              <a:stretch/>
+            </p:blipFill>
+            <p:spPr>
+              <a:xfrm>
+                <a:off x="129258" y="0"/>
+                <a:ext cx="3422690" cy="6858000"/>
+              </a:xfrm>
+              <a:prstGeom prst="rect">
+                <a:avLst/>
+              </a:prstGeom>
+            </p:spPr>
+          </p:pic>
+          <p:sp>
+            <p:nvSpPr>
+              <p:cNvPr id="2" name="TextBox 1">
+                <a:extLst>
+                  <a:ext uri="{FF2B5EF4-FFF2-40B4-BE49-F238E27FC236}">
+                    <a16:creationId xmlns:a16="http://schemas.microsoft.com/office/drawing/2014/main" id="{C00D46E2-5964-4BAB-B495-0D8DE956ADCF}"/>
+                  </a:ext>
+                </a:extLst>
+              </p:cNvPr>
+              <p:cNvSpPr txBox="1"/>
+              <p:nvPr/>
+            </p:nvSpPr>
+            <p:spPr>
+              <a:xfrm rot="16200000">
+                <a:off x="-1177780" y="1513251"/>
+                <a:ext cx="2791461" cy="246221"/>
+              </a:xfrm>
+              <a:prstGeom prst="rect">
+                <a:avLst/>
+              </a:prstGeom>
+              <a:solidFill>
+                <a:schemeClr val="bg1"/>
+              </a:solidFill>
+            </p:spPr>
+            <p:txBody>
+              <a:bodyPr wrap="square" rtlCol="0">
+                <a:spAutoFit/>
+              </a:bodyPr>
+              <a:lstStyle/>
+              <a:p>
+                <a:pPr algn="ctr"/>
+                <a:r>
+                  <a:rPr lang="en-US" sz="1000" dirty="0">
+                    <a:latin typeface="Arial" panose="020B0604020202020204" pitchFamily="34" charset="0"/>
+                    <a:cs typeface="Arial" panose="020B0604020202020204" pitchFamily="34" charset="0"/>
+                  </a:rPr>
+                  <a:t>Field SOC Stock (kg m</a:t>
+                </a:r>
+                <a:r>
+                  <a:rPr lang="en-US" sz="1000" baseline="30000" dirty="0">
+                    <a:latin typeface="Arial" panose="020B0604020202020204" pitchFamily="34" charset="0"/>
+                    <a:cs typeface="Arial" panose="020B0604020202020204" pitchFamily="34" charset="0"/>
+                  </a:rPr>
+                  <a:t>-2</a:t>
+                </a:r>
+                <a:r>
+                  <a:rPr lang="en-US" sz="1000" dirty="0">
+                    <a:latin typeface="Arial" panose="020B0604020202020204" pitchFamily="34" charset="0"/>
+                    <a:cs typeface="Arial" panose="020B0604020202020204" pitchFamily="34" charset="0"/>
+                  </a:rPr>
+                  <a:t>)</a:t>
+                </a:r>
+              </a:p>
+            </p:txBody>
+          </p:sp>
+          <p:sp>
+            <p:nvSpPr>
+              <p:cNvPr id="9" name="TextBox 8">
+                <a:extLst>
+                  <a:ext uri="{FF2B5EF4-FFF2-40B4-BE49-F238E27FC236}">
+                    <a16:creationId xmlns:a16="http://schemas.microsoft.com/office/drawing/2014/main" id="{63C99566-C7DB-415C-B48A-C7D97E24C1F9}"/>
+                  </a:ext>
+                </a:extLst>
+              </p:cNvPr>
+              <p:cNvSpPr txBox="1"/>
+              <p:nvPr/>
+            </p:nvSpPr>
+            <p:spPr>
+              <a:xfrm rot="16200000">
+                <a:off x="-1177781" y="4927772"/>
+                <a:ext cx="2791461" cy="246221"/>
+              </a:xfrm>
+              <a:prstGeom prst="rect">
+                <a:avLst/>
+              </a:prstGeom>
+              <a:solidFill>
+                <a:schemeClr val="bg1"/>
+              </a:solidFill>
+            </p:spPr>
+            <p:txBody>
+              <a:bodyPr wrap="square" rtlCol="0">
+                <a:spAutoFit/>
+              </a:bodyPr>
+              <a:lstStyle/>
+              <a:p>
+                <a:pPr algn="ctr"/>
+                <a:r>
+                  <a:rPr lang="en-US" sz="1000" dirty="0">
+                    <a:latin typeface="Arial" panose="020B0604020202020204" pitchFamily="34" charset="0"/>
+                    <a:cs typeface="Arial" panose="020B0604020202020204" pitchFamily="34" charset="0"/>
+                  </a:rPr>
+                  <a:t>Field SOC Stock (kg m</a:t>
+                </a:r>
+                <a:r>
+                  <a:rPr lang="en-US" sz="1000" baseline="30000" dirty="0">
+                    <a:latin typeface="Arial" panose="020B0604020202020204" pitchFamily="34" charset="0"/>
+                    <a:cs typeface="Arial" panose="020B0604020202020204" pitchFamily="34" charset="0"/>
+                  </a:rPr>
+                  <a:t>-2</a:t>
+                </a:r>
+                <a:r>
+                  <a:rPr lang="en-US" sz="1000" dirty="0">
+                    <a:latin typeface="Arial" panose="020B0604020202020204" pitchFamily="34" charset="0"/>
+                    <a:cs typeface="Arial" panose="020B0604020202020204" pitchFamily="34" charset="0"/>
+                  </a:rPr>
+                  <a:t>)</a:t>
+                </a:r>
+              </a:p>
+            </p:txBody>
+          </p:sp>
+          <p:sp>
+            <p:nvSpPr>
+              <p:cNvPr id="10" name="TextBox 9">
+                <a:extLst>
+                  <a:ext uri="{FF2B5EF4-FFF2-40B4-BE49-F238E27FC236}">
+                    <a16:creationId xmlns:a16="http://schemas.microsoft.com/office/drawing/2014/main" id="{85C7BEC1-295F-498A-BFD5-5B89F7C7AC29}"/>
+                  </a:ext>
+                </a:extLst>
+              </p:cNvPr>
+              <p:cNvSpPr txBox="1"/>
+              <p:nvPr/>
+            </p:nvSpPr>
+            <p:spPr>
+              <a:xfrm>
+                <a:off x="517516" y="3177113"/>
+                <a:ext cx="2987375" cy="246221"/>
+              </a:xfrm>
+              <a:prstGeom prst="rect">
+                <a:avLst/>
+              </a:prstGeom>
+              <a:solidFill>
+                <a:schemeClr val="bg1"/>
+              </a:solidFill>
+            </p:spPr>
+            <p:txBody>
+              <a:bodyPr wrap="square" rtlCol="0">
+                <a:spAutoFit/>
+              </a:bodyPr>
+              <a:lstStyle/>
+              <a:p>
+                <a:pPr algn="ctr"/>
+                <a:r>
+                  <a:rPr lang="en-US" sz="1000" dirty="0">
+                    <a:latin typeface="Arial" panose="020B0604020202020204" pitchFamily="34" charset="0"/>
+                    <a:cs typeface="Arial" panose="020B0604020202020204" pitchFamily="34" charset="0"/>
+                  </a:rPr>
+                  <a:t>MIMICS SOC Stock (kg m</a:t>
+                </a:r>
+                <a:r>
+                  <a:rPr lang="en-US" sz="1000" baseline="30000" dirty="0">
+                    <a:latin typeface="Arial" panose="020B0604020202020204" pitchFamily="34" charset="0"/>
+                    <a:cs typeface="Arial" panose="020B0604020202020204" pitchFamily="34" charset="0"/>
+                  </a:rPr>
+                  <a:t>-2</a:t>
+                </a:r>
+                <a:r>
+                  <a:rPr lang="en-US" sz="1000" dirty="0">
+                    <a:latin typeface="Arial" panose="020B0604020202020204" pitchFamily="34" charset="0"/>
+                    <a:cs typeface="Arial" panose="020B0604020202020204" pitchFamily="34" charset="0"/>
+                  </a:rPr>
+                  <a:t>)</a:t>
+                </a:r>
+              </a:p>
+            </p:txBody>
+          </p:sp>
+          <p:sp>
+            <p:nvSpPr>
+              <p:cNvPr id="11" name="TextBox 10">
+                <a:extLst>
+                  <a:ext uri="{FF2B5EF4-FFF2-40B4-BE49-F238E27FC236}">
+                    <a16:creationId xmlns:a16="http://schemas.microsoft.com/office/drawing/2014/main" id="{5973F2BF-FBD8-4270-A956-9E48973662AD}"/>
+                  </a:ext>
+                </a:extLst>
+              </p:cNvPr>
+              <p:cNvSpPr txBox="1"/>
+              <p:nvPr/>
+            </p:nvSpPr>
+            <p:spPr>
+              <a:xfrm>
+                <a:off x="513503" y="6608123"/>
+                <a:ext cx="2987375" cy="246221"/>
+              </a:xfrm>
+              <a:prstGeom prst="rect">
+                <a:avLst/>
+              </a:prstGeom>
+              <a:solidFill>
+                <a:schemeClr val="bg1"/>
+              </a:solidFill>
+            </p:spPr>
+            <p:txBody>
+              <a:bodyPr wrap="square" rtlCol="0">
+                <a:spAutoFit/>
+              </a:bodyPr>
+              <a:lstStyle/>
+              <a:p>
+                <a:pPr algn="ctr"/>
+                <a:r>
+                  <a:rPr lang="en-US" sz="1000" dirty="0">
+                    <a:latin typeface="Arial" panose="020B0604020202020204" pitchFamily="34" charset="0"/>
+                    <a:cs typeface="Arial" panose="020B0604020202020204" pitchFamily="34" charset="0"/>
+                  </a:rPr>
+                  <a:t>MIMICS SOC Stock (kg m</a:t>
+                </a:r>
+                <a:r>
+                  <a:rPr lang="en-US" sz="1000" baseline="30000" dirty="0">
+                    <a:latin typeface="Arial" panose="020B0604020202020204" pitchFamily="34" charset="0"/>
+                    <a:cs typeface="Arial" panose="020B0604020202020204" pitchFamily="34" charset="0"/>
+                  </a:rPr>
+                  <a:t>-2</a:t>
+                </a:r>
+                <a:r>
+                  <a:rPr lang="en-US" sz="1000" dirty="0">
+                    <a:latin typeface="Arial" panose="020B0604020202020204" pitchFamily="34" charset="0"/>
+                    <a:cs typeface="Arial" panose="020B0604020202020204" pitchFamily="34" charset="0"/>
+                  </a:rPr>
+                  <a:t>)</a:t>
+                </a:r>
+              </a:p>
+            </p:txBody>
+          </p:sp>
+        </p:grpSp>
+        <p:sp>
+          <p:nvSpPr>
+            <p:cNvPr id="4" name="TextBox 3">
+              <a:extLst>
+                <a:ext uri="{FF2B5EF4-FFF2-40B4-BE49-F238E27FC236}">
+                  <a16:creationId xmlns:a16="http://schemas.microsoft.com/office/drawing/2014/main" id="{3A7E7B01-079A-4145-B001-4220DDDE844B}"/>
+                </a:ext>
+              </a:extLst>
+            </p:cNvPr>
+            <p:cNvSpPr txBox="1"/>
+            <p:nvPr/>
+          </p:nvSpPr>
+          <p:spPr>
+            <a:xfrm>
+              <a:off x="489439" y="196356"/>
+              <a:ext cx="436992" cy="369332"/>
+            </a:xfrm>
+            <a:prstGeom prst="rect">
+              <a:avLst/>
+            </a:prstGeom>
+            <a:noFill/>
+          </p:spPr>
+          <p:txBody>
+            <a:bodyPr wrap="square" rtlCol="0">
+              <a:spAutoFit/>
+            </a:bodyPr>
+            <a:lstStyle/>
+            <a:p>
+              <a:r>
+                <a:rPr lang="en-US" dirty="0"/>
+                <a:t>A</a:t>
+              </a:r>
+            </a:p>
+          </p:txBody>
+        </p:sp>
+        <p:sp>
+          <p:nvSpPr>
+            <p:cNvPr id="13" name="TextBox 12">
+              <a:extLst>
+                <a:ext uri="{FF2B5EF4-FFF2-40B4-BE49-F238E27FC236}">
+                  <a16:creationId xmlns:a16="http://schemas.microsoft.com/office/drawing/2014/main" id="{C80CF03F-C2D0-45C1-A246-694E53EB8A9F}"/>
+                </a:ext>
+              </a:extLst>
+            </p:cNvPr>
+            <p:cNvSpPr txBox="1"/>
+            <p:nvPr/>
+          </p:nvSpPr>
+          <p:spPr>
+            <a:xfrm>
+              <a:off x="489439" y="3619955"/>
+              <a:ext cx="436992" cy="369332"/>
+            </a:xfrm>
+            <a:prstGeom prst="rect">
+              <a:avLst/>
+            </a:prstGeom>
+            <a:noFill/>
+          </p:spPr>
+          <p:txBody>
+            <a:bodyPr wrap="square" rtlCol="0">
+              <a:spAutoFit/>
+            </a:bodyPr>
+            <a:lstStyle/>
+            <a:p>
+              <a:r>
+                <a:rPr lang="en-US" dirty="0"/>
+                <a:t>B</a:t>
+              </a:r>
+            </a:p>
+          </p:txBody>
+        </p:sp>
       </p:grpSp>
     </p:spTree>
     <p:extLst>

</xml_diff>